<commit_message>
add runtime API proposal
</commit_message>
<xml_diff>
--- a/designs/function-node-lifecycle/lifecycle.pptx
+++ b/designs/function-node-lifecycle/lifecycle.pptx
@@ -3117,7 +3117,7 @@
         <p:spPr>
           <a:xfrm>
             <a:off x="1159207" y="5310287"/>
-            <a:ext cx="3044423" cy="481350"/>
+            <a:ext cx="3483646" cy="869149"/>
           </a:xfrm>
           <a:prstGeom prst="rect">
             <a:avLst/>
@@ -3159,6 +3159,41 @@
                 <a:ea typeface="游ゴシック Medium" panose="020B0500000000000000" pitchFamily="50" charset="-128"/>
               </a:rPr>
               <a:t>execute finalization code</a:t>
+            </a:r>
+          </a:p>
+          <a:p>
+            <a:pPr marL="800100" lvl="1" indent="-342900">
+              <a:buFont typeface="+mj-lt"/>
+              <a:buAutoNum type="arabicPeriod"/>
+            </a:pPr>
+            <a:r>
+              <a:rPr lang="en-US" altLang="ja-JP" sz="1400" dirty="0">
+                <a:solidFill>
+                  <a:schemeClr val="tx1"/>
+                </a:solidFill>
+                <a:latin typeface="游ゴシック Medium" panose="020B0500000000000000" pitchFamily="50" charset="-128"/>
+                <a:ea typeface="游ゴシック Medium" panose="020B0500000000000000" pitchFamily="50" charset="-128"/>
+              </a:rPr>
+              <a:t>remove locally install modules</a:t>
+            </a:r>
+            <a:br>
+              <a:rPr lang="en-US" altLang="ja-JP" sz="1400" dirty="0">
+                <a:solidFill>
+                  <a:schemeClr val="tx1"/>
+                </a:solidFill>
+                <a:latin typeface="游ゴシック Medium" panose="020B0500000000000000" pitchFamily="50" charset="-128"/>
+                <a:ea typeface="游ゴシック Medium" panose="020B0500000000000000" pitchFamily="50" charset="-128"/>
+              </a:rPr>
+            </a:br>
+            <a:r>
+              <a:rPr lang="en-US" altLang="ja-JP" sz="1400" dirty="0">
+                <a:solidFill>
+                  <a:schemeClr val="tx1"/>
+                </a:solidFill>
+                <a:latin typeface="游ゴシック Medium" panose="020B0500000000000000" pitchFamily="50" charset="-128"/>
+                <a:ea typeface="游ゴシック Medium" panose="020B0500000000000000" pitchFamily="50" charset="-128"/>
+              </a:rPr>
+              <a:t>if node is removed</a:t>
             </a:r>
           </a:p>
         </p:txBody>

</xml_diff>